<commit_message>
update week 13 review
</commit_message>
<xml_diff>
--- a/review/lecture-review-week-13.pptx
+++ b/review/lecture-review-week-13.pptx
@@ -263,7 +263,7 @@
           <a:p>
             <a:fld id="{DAC1E4EF-1A07-8740-80B6-D041CCD5E262}" type="datetimeFigureOut">
               <a:rPr lang="en-US" smtClean="0"/>
-              <a:t>11/23/19</a:t>
+              <a:t>12/1/19</a:t>
             </a:fld>
             <a:endParaRPr lang="en-US"/>
           </a:p>
@@ -461,7 +461,7 @@
           <a:p>
             <a:fld id="{DAC1E4EF-1A07-8740-80B6-D041CCD5E262}" type="datetimeFigureOut">
               <a:rPr lang="en-US" smtClean="0"/>
-              <a:t>11/23/19</a:t>
+              <a:t>12/1/19</a:t>
             </a:fld>
             <a:endParaRPr lang="en-US"/>
           </a:p>
@@ -669,7 +669,7 @@
           <a:p>
             <a:fld id="{DAC1E4EF-1A07-8740-80B6-D041CCD5E262}" type="datetimeFigureOut">
               <a:rPr lang="en-US" smtClean="0"/>
-              <a:t>11/23/19</a:t>
+              <a:t>12/1/19</a:t>
             </a:fld>
             <a:endParaRPr lang="en-US"/>
           </a:p>
@@ -867,7 +867,7 @@
           <a:p>
             <a:fld id="{DAC1E4EF-1A07-8740-80B6-D041CCD5E262}" type="datetimeFigureOut">
               <a:rPr lang="en-US" smtClean="0"/>
-              <a:t>11/23/19</a:t>
+              <a:t>12/1/19</a:t>
             </a:fld>
             <a:endParaRPr lang="en-US"/>
           </a:p>
@@ -1142,7 +1142,7 @@
           <a:p>
             <a:fld id="{DAC1E4EF-1A07-8740-80B6-D041CCD5E262}" type="datetimeFigureOut">
               <a:rPr lang="en-US" smtClean="0"/>
-              <a:t>11/23/19</a:t>
+              <a:t>12/1/19</a:t>
             </a:fld>
             <a:endParaRPr lang="en-US"/>
           </a:p>
@@ -1407,7 +1407,7 @@
           <a:p>
             <a:fld id="{DAC1E4EF-1A07-8740-80B6-D041CCD5E262}" type="datetimeFigureOut">
               <a:rPr lang="en-US" smtClean="0"/>
-              <a:t>11/23/19</a:t>
+              <a:t>12/1/19</a:t>
             </a:fld>
             <a:endParaRPr lang="en-US"/>
           </a:p>
@@ -1819,7 +1819,7 @@
           <a:p>
             <a:fld id="{DAC1E4EF-1A07-8740-80B6-D041CCD5E262}" type="datetimeFigureOut">
               <a:rPr lang="en-US" smtClean="0"/>
-              <a:t>11/23/19</a:t>
+              <a:t>12/1/19</a:t>
             </a:fld>
             <a:endParaRPr lang="en-US"/>
           </a:p>
@@ -1960,7 +1960,7 @@
           <a:p>
             <a:fld id="{DAC1E4EF-1A07-8740-80B6-D041CCD5E262}" type="datetimeFigureOut">
               <a:rPr lang="en-US" smtClean="0"/>
-              <a:t>11/23/19</a:t>
+              <a:t>12/1/19</a:t>
             </a:fld>
             <a:endParaRPr lang="en-US"/>
           </a:p>
@@ -2073,7 +2073,7 @@
           <a:p>
             <a:fld id="{DAC1E4EF-1A07-8740-80B6-D041CCD5E262}" type="datetimeFigureOut">
               <a:rPr lang="en-US" smtClean="0"/>
-              <a:t>11/23/19</a:t>
+              <a:t>12/1/19</a:t>
             </a:fld>
             <a:endParaRPr lang="en-US"/>
           </a:p>
@@ -2384,7 +2384,7 @@
           <a:p>
             <a:fld id="{DAC1E4EF-1A07-8740-80B6-D041CCD5E262}" type="datetimeFigureOut">
               <a:rPr lang="en-US" smtClean="0"/>
-              <a:t>11/23/19</a:t>
+              <a:t>12/1/19</a:t>
             </a:fld>
             <a:endParaRPr lang="en-US"/>
           </a:p>
@@ -2672,7 +2672,7 @@
           <a:p>
             <a:fld id="{DAC1E4EF-1A07-8740-80B6-D041CCD5E262}" type="datetimeFigureOut">
               <a:rPr lang="en-US" smtClean="0"/>
-              <a:t>11/23/19</a:t>
+              <a:t>12/1/19</a:t>
             </a:fld>
             <a:endParaRPr lang="en-US"/>
           </a:p>
@@ -2913,7 +2913,7 @@
           <a:p>
             <a:fld id="{DAC1E4EF-1A07-8740-80B6-D041CCD5E262}" type="datetimeFigureOut">
               <a:rPr lang="en-US" smtClean="0"/>
-              <a:t>11/23/19</a:t>
+              <a:t>12/1/19</a:t>
             </a:fld>
             <a:endParaRPr lang="en-US"/>
           </a:p>
@@ -3866,7 +3866,14 @@
             <a:pPr lvl="2"/>
             <a:r>
               <a:rPr lang="en-US" dirty="0"/>
-              <a:t>Container definition</a:t>
+              <a:t>Cluster</a:t>
+            </a:r>
+          </a:p>
+          <a:p>
+            <a:pPr lvl="2"/>
+            <a:r>
+              <a:rPr lang="en-US" dirty="0"/>
+              <a:t>Service</a:t>
             </a:r>
           </a:p>
           <a:p>
@@ -3880,18 +3887,41 @@
             <a:pPr lvl="2"/>
             <a:r>
               <a:rPr lang="en-US" dirty="0"/>
-              <a:t>Service</a:t>
-            </a:r>
-          </a:p>
-          <a:p>
-            <a:pPr lvl="2"/>
-            <a:r>
-              <a:rPr lang="en-US" dirty="0"/>
-              <a:t>Cluster</a:t>
-            </a:r>
-          </a:p>
-        </p:txBody>
-      </p:sp>
+              <a:t>Container definition</a:t>
+            </a:r>
+          </a:p>
+        </p:txBody>
+      </p:sp>
+      <p:pic>
+        <p:nvPicPr>
+          <p:cNvPr id="5" name="Picture 4">
+            <a:extLst>
+              <a:ext uri="{FF2B5EF4-FFF2-40B4-BE49-F238E27FC236}">
+                <a16:creationId xmlns:a16="http://schemas.microsoft.com/office/drawing/2014/main" id="{495639F1-23B6-3242-A868-06B159D9407C}"/>
+              </a:ext>
+            </a:extLst>
+          </p:cNvPr>
+          <p:cNvPicPr>
+            <a:picLocks noChangeAspect="1"/>
+          </p:cNvPicPr>
+          <p:nvPr/>
+        </p:nvPicPr>
+        <p:blipFill>
+          <a:blip r:embed="rId2"/>
+          <a:stretch>
+            <a:fillRect/>
+          </a:stretch>
+        </p:blipFill>
+        <p:spPr>
+          <a:xfrm>
+            <a:off x="5396948" y="3069388"/>
+            <a:ext cx="5742056" cy="2859856"/>
+          </a:xfrm>
+          <a:prstGeom prst="rect">
+            <a:avLst/>
+          </a:prstGeom>
+        </p:spPr>
+      </p:pic>
     </p:spTree>
     <p:extLst>
       <p:ext uri="{BB962C8B-B14F-4D97-AF65-F5344CB8AC3E}">

</xml_diff>